<commit_message>
edit developer guide for image filters to include operations used
</commit_message>
<xml_diff>
--- a/docs/diagrams/BlackWhiteCommandSequenceDiagram.pptx
+++ b/docs/diagrams/BlackWhiteCommandSequenceDiagram.pptx
@@ -104,6 +104,11 @@
       </a:defRPr>
     </a:lvl9pPr>
   </p:defaultTextStyle>
+  <p:extLst>
+    <p:ext uri="{EFAFB233-063F-42B5-8137-9DF3F51BA10A}">
+      <p15:sldGuideLst xmlns:p15="http://schemas.microsoft.com/office/powerpoint/2012/main"/>
+    </p:ext>
+  </p:extLst>
 </p:presentation>
 </file>
 
@@ -254,7 +259,7 @@
           <a:p>
             <a:fld id="{5CC94D64-D2E9-0B4C-99D2-A05D60178878}" type="datetimeFigureOut">
               <a:rPr lang="en-US" smtClean="0"/>
-              <a:t>3/30/19</a:t>
+              <a:t>4/1/19</a:t>
             </a:fld>
             <a:endParaRPr lang="en-US"/>
           </a:p>
@@ -452,7 +457,7 @@
           <a:p>
             <a:fld id="{5CC94D64-D2E9-0B4C-99D2-A05D60178878}" type="datetimeFigureOut">
               <a:rPr lang="en-US" smtClean="0"/>
-              <a:t>3/30/19</a:t>
+              <a:t>4/1/19</a:t>
             </a:fld>
             <a:endParaRPr lang="en-US"/>
           </a:p>
@@ -660,7 +665,7 @@
           <a:p>
             <a:fld id="{5CC94D64-D2E9-0B4C-99D2-A05D60178878}" type="datetimeFigureOut">
               <a:rPr lang="en-US" smtClean="0"/>
-              <a:t>3/30/19</a:t>
+              <a:t>4/1/19</a:t>
             </a:fld>
             <a:endParaRPr lang="en-US"/>
           </a:p>
@@ -858,7 +863,7 @@
           <a:p>
             <a:fld id="{5CC94D64-D2E9-0B4C-99D2-A05D60178878}" type="datetimeFigureOut">
               <a:rPr lang="en-US" smtClean="0"/>
-              <a:t>3/30/19</a:t>
+              <a:t>4/1/19</a:t>
             </a:fld>
             <a:endParaRPr lang="en-US"/>
           </a:p>
@@ -1133,7 +1138,7 @@
           <a:p>
             <a:fld id="{5CC94D64-D2E9-0B4C-99D2-A05D60178878}" type="datetimeFigureOut">
               <a:rPr lang="en-US" smtClean="0"/>
-              <a:t>3/30/19</a:t>
+              <a:t>4/1/19</a:t>
             </a:fld>
             <a:endParaRPr lang="en-US"/>
           </a:p>
@@ -1398,7 +1403,7 @@
           <a:p>
             <a:fld id="{5CC94D64-D2E9-0B4C-99D2-A05D60178878}" type="datetimeFigureOut">
               <a:rPr lang="en-US" smtClean="0"/>
-              <a:t>3/30/19</a:t>
+              <a:t>4/1/19</a:t>
             </a:fld>
             <a:endParaRPr lang="en-US"/>
           </a:p>
@@ -1810,7 +1815,7 @@
           <a:p>
             <a:fld id="{5CC94D64-D2E9-0B4C-99D2-A05D60178878}" type="datetimeFigureOut">
               <a:rPr lang="en-US" smtClean="0"/>
-              <a:t>3/30/19</a:t>
+              <a:t>4/1/19</a:t>
             </a:fld>
             <a:endParaRPr lang="en-US"/>
           </a:p>
@@ -1951,7 +1956,7 @@
           <a:p>
             <a:fld id="{5CC94D64-D2E9-0B4C-99D2-A05D60178878}" type="datetimeFigureOut">
               <a:rPr lang="en-US" smtClean="0"/>
-              <a:t>3/30/19</a:t>
+              <a:t>4/1/19</a:t>
             </a:fld>
             <a:endParaRPr lang="en-US"/>
           </a:p>
@@ -2064,7 +2069,7 @@
           <a:p>
             <a:fld id="{5CC94D64-D2E9-0B4C-99D2-A05D60178878}" type="datetimeFigureOut">
               <a:rPr lang="en-US" smtClean="0"/>
-              <a:t>3/30/19</a:t>
+              <a:t>4/1/19</a:t>
             </a:fld>
             <a:endParaRPr lang="en-US"/>
           </a:p>
@@ -2375,7 +2380,7 @@
           <a:p>
             <a:fld id="{5CC94D64-D2E9-0B4C-99D2-A05D60178878}" type="datetimeFigureOut">
               <a:rPr lang="en-US" smtClean="0"/>
-              <a:t>3/30/19</a:t>
+              <a:t>4/1/19</a:t>
             </a:fld>
             <a:endParaRPr lang="en-US"/>
           </a:p>
@@ -2663,7 +2668,7 @@
           <a:p>
             <a:fld id="{5CC94D64-D2E9-0B4C-99D2-A05D60178878}" type="datetimeFigureOut">
               <a:rPr lang="en-US" smtClean="0"/>
-              <a:t>3/30/19</a:t>
+              <a:t>4/1/19</a:t>
             </a:fld>
             <a:endParaRPr lang="en-US"/>
           </a:p>
@@ -2904,7 +2909,7 @@
           <a:p>
             <a:fld id="{5CC94D64-D2E9-0B4C-99D2-A05D60178878}" type="datetimeFigureOut">
               <a:rPr lang="en-US" smtClean="0"/>
-              <a:t>3/30/19</a:t>
+              <a:t>4/1/19</a:t>
             </a:fld>
             <a:endParaRPr lang="en-US"/>
           </a:p>
@@ -4878,7 +4883,6 @@
           <p:cNvCxnSpPr>
             <a:cxnSpLocks/>
             <a:stCxn id="84" idx="0"/>
-            <a:endCxn id="85" idx="0"/>
           </p:cNvCxnSpPr>
           <p:nvPr/>
         </p:nvCxnSpPr>
@@ -4959,84 +4963,6 @@
           </a:fontRef>
         </p:style>
       </p:cxnSp>
-      <p:sp>
-        <p:nvSpPr>
-          <p:cNvPr id="78" name="TextBox 77">
-            <a:extLst>
-              <a:ext uri="{FF2B5EF4-FFF2-40B4-BE49-F238E27FC236}">
-                <a16:creationId xmlns:a16="http://schemas.microsoft.com/office/drawing/2014/main" id="{0772AC28-6CCA-D043-ABB2-97A18FBB6317}"/>
-              </a:ext>
-            </a:extLst>
-          </p:cNvPr>
-          <p:cNvSpPr txBox="1"/>
-          <p:nvPr/>
-        </p:nvSpPr>
-        <p:spPr>
-          <a:xfrm>
-            <a:off x="7933322" y="5478876"/>
-            <a:ext cx="258404" cy="261610"/>
-          </a:xfrm>
-          <a:prstGeom prst="rect">
-            <a:avLst/>
-          </a:prstGeom>
-          <a:noFill/>
-        </p:spPr>
-        <p:txBody>
-          <a:bodyPr wrap="square" rtlCol="0">
-            <a:spAutoFit/>
-          </a:bodyPr>
-          <a:lstStyle/>
-          <a:p>
-            <a:r>
-              <a:rPr lang="en-SG" sz="1100" dirty="0">
-                <a:solidFill>
-                  <a:srgbClr val="002060"/>
-                </a:solidFill>
-              </a:rPr>
-              <a:t>X</a:t>
-            </a:r>
-          </a:p>
-        </p:txBody>
-      </p:sp>
-      <p:sp>
-        <p:nvSpPr>
-          <p:cNvPr id="85" name="TextBox 84">
-            <a:extLst>
-              <a:ext uri="{FF2B5EF4-FFF2-40B4-BE49-F238E27FC236}">
-                <a16:creationId xmlns:a16="http://schemas.microsoft.com/office/drawing/2014/main" id="{A2AA5E9C-667D-CD42-8A1D-D3C2929DECFA}"/>
-              </a:ext>
-            </a:extLst>
-          </p:cNvPr>
-          <p:cNvSpPr txBox="1"/>
-          <p:nvPr/>
-        </p:nvSpPr>
-        <p:spPr>
-          <a:xfrm>
-            <a:off x="9534410" y="5502296"/>
-            <a:ext cx="258404" cy="261610"/>
-          </a:xfrm>
-          <a:prstGeom prst="rect">
-            <a:avLst/>
-          </a:prstGeom>
-          <a:noFill/>
-        </p:spPr>
-        <p:txBody>
-          <a:bodyPr wrap="square" rtlCol="0">
-            <a:spAutoFit/>
-          </a:bodyPr>
-          <a:lstStyle/>
-          <a:p>
-            <a:r>
-              <a:rPr lang="en-SG" sz="1100" dirty="0">
-                <a:solidFill>
-                  <a:srgbClr val="002060"/>
-                </a:solidFill>
-              </a:rPr>
-              <a:t>X</a:t>
-            </a:r>
-          </a:p>
-        </p:txBody>
-      </p:sp>
       <p:cxnSp>
         <p:nvCxnSpPr>
           <p:cNvPr id="51" name="Straight Arrow Connector 50">

</xml_diff>